<commit_message>
Fix typo in definition of map
</commit_message>
<xml_diff>
--- a/06-hop/lec.pptx
+++ b/06-hop/lec.pptx
@@ -234,7 +234,7 @@
           <a:p>
             <a:fld id="{5367F125-181F-9A48-A24E-AAD89CB055B5}" type="datetimeFigureOut">
               <a:rPr lang="en-US" smtClean="0"/>
-              <a:t>9/12/19</a:t>
+              <a:t>9/17/19</a:t>
             </a:fld>
             <a:endParaRPr lang="en-US"/>
           </a:p>
@@ -7203,7 +7203,7 @@
           <a:p>
             <a:fld id="{96331252-4874-F047-84B8-3D3EF8743E79}" type="datetimeFigureOut">
               <a:rPr lang="en-US" smtClean="0"/>
-              <a:t>9/12/19</a:t>
+              <a:t>9/17/19</a:t>
             </a:fld>
             <a:endParaRPr lang="en-US"/>
           </a:p>
@@ -7470,7 +7470,7 @@
           <a:p>
             <a:fld id="{96331252-4874-F047-84B8-3D3EF8743E79}" type="datetimeFigureOut">
               <a:rPr lang="en-US" smtClean="0"/>
-              <a:t>9/12/19</a:t>
+              <a:t>9/17/19</a:t>
             </a:fld>
             <a:endParaRPr lang="en-US"/>
           </a:p>
@@ -7648,7 +7648,7 @@
           <a:p>
             <a:fld id="{96331252-4874-F047-84B8-3D3EF8743E79}" type="datetimeFigureOut">
               <a:rPr lang="en-US" smtClean="0"/>
-              <a:t>9/12/19</a:t>
+              <a:t>9/17/19</a:t>
             </a:fld>
             <a:endParaRPr lang="en-US"/>
           </a:p>
@@ -7824,7 +7824,7 @@
           <a:p>
             <a:fld id="{96331252-4874-F047-84B8-3D3EF8743E79}" type="datetimeFigureOut">
               <a:rPr lang="en-US" smtClean="0"/>
-              <a:t>9/12/19</a:t>
+              <a:t>9/17/19</a:t>
             </a:fld>
             <a:endParaRPr lang="en-US"/>
           </a:p>
@@ -8073,7 +8073,7 @@
           <a:p>
             <a:fld id="{96331252-4874-F047-84B8-3D3EF8743E79}" type="datetimeFigureOut">
               <a:rPr lang="en-US" smtClean="0"/>
-              <a:t>9/12/19</a:t>
+              <a:t>9/17/19</a:t>
             </a:fld>
             <a:endParaRPr lang="en-US"/>
           </a:p>
@@ -8358,7 +8358,7 @@
           <a:p>
             <a:fld id="{96331252-4874-F047-84B8-3D3EF8743E79}" type="datetimeFigureOut">
               <a:rPr lang="en-US" smtClean="0"/>
-              <a:t>9/12/19</a:t>
+              <a:t>9/17/19</a:t>
             </a:fld>
             <a:endParaRPr lang="en-US"/>
           </a:p>
@@ -8777,7 +8777,7 @@
           <a:p>
             <a:fld id="{96331252-4874-F047-84B8-3D3EF8743E79}" type="datetimeFigureOut">
               <a:rPr lang="en-US" smtClean="0"/>
-              <a:t>9/12/19</a:t>
+              <a:t>9/17/19</a:t>
             </a:fld>
             <a:endParaRPr lang="en-US"/>
           </a:p>
@@ -8894,7 +8894,7 @@
           <a:p>
             <a:fld id="{96331252-4874-F047-84B8-3D3EF8743E79}" type="datetimeFigureOut">
               <a:rPr lang="en-US" smtClean="0"/>
-              <a:t>9/12/19</a:t>
+              <a:t>9/17/19</a:t>
             </a:fld>
             <a:endParaRPr lang="en-US"/>
           </a:p>
@@ -8989,7 +8989,7 @@
           <a:p>
             <a:fld id="{96331252-4874-F047-84B8-3D3EF8743E79}" type="datetimeFigureOut">
               <a:rPr lang="en-US" smtClean="0"/>
-              <a:t>9/12/19</a:t>
+              <a:t>9/17/19</a:t>
             </a:fld>
             <a:endParaRPr lang="en-US"/>
           </a:p>
@@ -9264,7 +9264,7 @@
           <a:p>
             <a:fld id="{96331252-4874-F047-84B8-3D3EF8743E79}" type="datetimeFigureOut">
               <a:rPr lang="en-US" smtClean="0"/>
-              <a:t>9/12/19</a:t>
+              <a:t>9/17/19</a:t>
             </a:fld>
             <a:endParaRPr lang="en-US"/>
           </a:p>
@@ -9516,7 +9516,7 @@
           <a:p>
             <a:fld id="{96331252-4874-F047-84B8-3D3EF8743E79}" type="datetimeFigureOut">
               <a:rPr lang="en-US" smtClean="0"/>
-              <a:t>9/12/19</a:t>
+              <a:t>9/17/19</a:t>
             </a:fld>
             <a:endParaRPr lang="en-US"/>
           </a:p>
@@ -9730,7 +9730,7 @@
             <a:fld id="{96331252-4874-F047-84B8-3D3EF8743E79}" type="datetimeFigureOut">
               <a:rPr lang="en-US" smtClean="0"/>
               <a:pPr/>
-              <a:t>9/12/19</a:t>
+              <a:t>9/17/19</a:t>
             </a:fld>
             <a:endParaRPr lang="en-US"/>
           </a:p>
@@ -12411,7 +12411,7 @@
                 </a:solidFill>
                 <a:latin typeface="Courier"/>
               </a:rPr>
-              <a:t> h x</a:t>
+              <a:t> f h</a:t>
             </a:r>
             <a:r>
               <a:rPr lang="fr-FR" sz="2700" dirty="0">

</xml_diff>